<commit_message>
func profile done, block profile awaits
</commit_message>
<xml_diff>
--- a/doc/CR-20210202.pptx
+++ b/doc/CR-20210202.pptx
@@ -11,6 +11,8 @@
     <p:sldId id="258" r:id="rId5"/>
     <p:sldId id="259" r:id="rId6"/>
     <p:sldId id="262" r:id="rId7"/>
+    <p:sldId id="263" r:id="rId8"/>
+    <p:sldId id="264" r:id="rId9"/>
   </p:sldIdLst>
   <p:sldSz cx="12192000" cy="6858000"/>
   <p:notesSz cx="6858000" cy="9144000"/>
@@ -109,6 +111,11 @@
       </a:defRPr>
     </a:lvl9pPr>
   </p:defaultTextStyle>
+  <p:extLst>
+    <p:ext uri="{EFAFB233-063F-42B5-8137-9DF3F51BA10A}">
+      <p15:sldGuideLst xmlns:p15="http://schemas.microsoft.com/office/powerpoint/2012/main"/>
+    </p:ext>
+  </p:extLst>
 </p:presentation>
 </file>
 
@@ -6243,7 +6250,7 @@
           <a:p>
             <a:fld id="{403374F6-491B-4410-BF99-DF51E2A038AC}" type="datetimeFigureOut">
               <a:rPr lang="zh-CN" altLang="en-US" smtClean="0"/>
-              <a:t>2021/2/1</a:t>
+              <a:t>2021/2/5</a:t>
             </a:fld>
             <a:endParaRPr lang="zh-CN" altLang="en-US"/>
           </a:p>
@@ -6443,7 +6450,7 @@
           <a:p>
             <a:fld id="{403374F6-491B-4410-BF99-DF51E2A038AC}" type="datetimeFigureOut">
               <a:rPr lang="zh-CN" altLang="en-US" smtClean="0"/>
-              <a:t>2021/2/1</a:t>
+              <a:t>2021/2/5</a:t>
             </a:fld>
             <a:endParaRPr lang="zh-CN" altLang="en-US"/>
           </a:p>
@@ -6653,7 +6660,7 @@
           <a:p>
             <a:fld id="{403374F6-491B-4410-BF99-DF51E2A038AC}" type="datetimeFigureOut">
               <a:rPr lang="zh-CN" altLang="en-US" smtClean="0"/>
-              <a:t>2021/2/1</a:t>
+              <a:t>2021/2/5</a:t>
             </a:fld>
             <a:endParaRPr lang="zh-CN" altLang="en-US"/>
           </a:p>
@@ -6853,7 +6860,7 @@
           <a:p>
             <a:fld id="{403374F6-491B-4410-BF99-DF51E2A038AC}" type="datetimeFigureOut">
               <a:rPr lang="zh-CN" altLang="en-US" smtClean="0"/>
-              <a:t>2021/2/1</a:t>
+              <a:t>2021/2/5</a:t>
             </a:fld>
             <a:endParaRPr lang="zh-CN" altLang="en-US"/>
           </a:p>
@@ -7129,7 +7136,7 @@
           <a:p>
             <a:fld id="{403374F6-491B-4410-BF99-DF51E2A038AC}" type="datetimeFigureOut">
               <a:rPr lang="zh-CN" altLang="en-US" smtClean="0"/>
-              <a:t>2021/2/1</a:t>
+              <a:t>2021/2/5</a:t>
             </a:fld>
             <a:endParaRPr lang="zh-CN" altLang="en-US"/>
           </a:p>
@@ -7397,7 +7404,7 @@
           <a:p>
             <a:fld id="{403374F6-491B-4410-BF99-DF51E2A038AC}" type="datetimeFigureOut">
               <a:rPr lang="zh-CN" altLang="en-US" smtClean="0"/>
-              <a:t>2021/2/1</a:t>
+              <a:t>2021/2/5</a:t>
             </a:fld>
             <a:endParaRPr lang="zh-CN" altLang="en-US"/>
           </a:p>
@@ -7812,7 +7819,7 @@
           <a:p>
             <a:fld id="{403374F6-491B-4410-BF99-DF51E2A038AC}" type="datetimeFigureOut">
               <a:rPr lang="zh-CN" altLang="en-US" smtClean="0"/>
-              <a:t>2021/2/1</a:t>
+              <a:t>2021/2/5</a:t>
             </a:fld>
             <a:endParaRPr lang="zh-CN" altLang="en-US"/>
           </a:p>
@@ -7954,7 +7961,7 @@
           <a:p>
             <a:fld id="{403374F6-491B-4410-BF99-DF51E2A038AC}" type="datetimeFigureOut">
               <a:rPr lang="zh-CN" altLang="en-US" smtClean="0"/>
-              <a:t>2021/2/1</a:t>
+              <a:t>2021/2/5</a:t>
             </a:fld>
             <a:endParaRPr lang="zh-CN" altLang="en-US"/>
           </a:p>
@@ -8067,7 +8074,7 @@
           <a:p>
             <a:fld id="{403374F6-491B-4410-BF99-DF51E2A038AC}" type="datetimeFigureOut">
               <a:rPr lang="zh-CN" altLang="en-US" smtClean="0"/>
-              <a:t>2021/2/1</a:t>
+              <a:t>2021/2/5</a:t>
             </a:fld>
             <a:endParaRPr lang="zh-CN" altLang="en-US"/>
           </a:p>
@@ -8380,7 +8387,7 @@
           <a:p>
             <a:fld id="{403374F6-491B-4410-BF99-DF51E2A038AC}" type="datetimeFigureOut">
               <a:rPr lang="zh-CN" altLang="en-US" smtClean="0"/>
-              <a:t>2021/2/1</a:t>
+              <a:t>2021/2/5</a:t>
             </a:fld>
             <a:endParaRPr lang="zh-CN" altLang="en-US"/>
           </a:p>
@@ -8669,7 +8676,7 @@
           <a:p>
             <a:fld id="{403374F6-491B-4410-BF99-DF51E2A038AC}" type="datetimeFigureOut">
               <a:rPr lang="zh-CN" altLang="en-US" smtClean="0"/>
-              <a:t>2021/2/1</a:t>
+              <a:t>2021/2/5</a:t>
             </a:fld>
             <a:endParaRPr lang="zh-CN" altLang="en-US"/>
           </a:p>
@@ -8912,7 +8919,7 @@
           <a:p>
             <a:fld id="{403374F6-491B-4410-BF99-DF51E2A038AC}" type="datetimeFigureOut">
               <a:rPr lang="zh-CN" altLang="en-US" smtClean="0"/>
-              <a:t>2021/2/1</a:t>
+              <a:t>2021/2/5</a:t>
             </a:fld>
             <a:endParaRPr lang="zh-CN" altLang="en-US"/>
           </a:p>
@@ -9998,6 +10005,303 @@
 </p:sld>
 </file>
 
+<file path=ppt/slides/slide7.xml><?xml version="1.0" encoding="utf-8"?>
+<p:sld xmlns:a="http://schemas.openxmlformats.org/drawingml/2006/main" xmlns:r="http://schemas.openxmlformats.org/officeDocument/2006/relationships" xmlns:p="http://schemas.openxmlformats.org/presentationml/2006/main">
+  <p:cSld>
+    <p:spTree>
+      <p:nvGrpSpPr>
+        <p:cNvPr id="1" name=""/>
+        <p:cNvGrpSpPr/>
+        <p:nvPr/>
+      </p:nvGrpSpPr>
+      <p:grpSpPr>
+        <a:xfrm>
+          <a:off x="0" y="0"/>
+          <a:ext cx="0" cy="0"/>
+          <a:chOff x="0" y="0"/>
+          <a:chExt cx="0" cy="0"/>
+        </a:xfrm>
+      </p:grpSpPr>
+      <p:sp>
+        <p:nvSpPr>
+          <p:cNvPr id="2" name="Title 1">
+            <a:extLst>
+              <a:ext uri="{FF2B5EF4-FFF2-40B4-BE49-F238E27FC236}">
+                <a16:creationId xmlns:a16="http://schemas.microsoft.com/office/drawing/2014/main" id="{60A650ED-FADA-400A-8C37-0FF94CD40500}"/>
+              </a:ext>
+            </a:extLst>
+          </p:cNvPr>
+          <p:cNvSpPr>
+            <a:spLocks noGrp="1"/>
+          </p:cNvSpPr>
+          <p:nvPr>
+            <p:ph type="title"/>
+          </p:nvPr>
+        </p:nvSpPr>
+        <p:spPr/>
+        <p:txBody>
+          <a:bodyPr/>
+          <a:lstStyle/>
+          <a:p>
+            <a:r>
+              <a:rPr lang="en-US" altLang="zh-CN" dirty="0"/>
+              <a:t>Peak pick</a:t>
+            </a:r>
+            <a:endParaRPr lang="zh-CN" altLang="en-US" dirty="0"/>
+          </a:p>
+        </p:txBody>
+      </p:sp>
+      <p:sp>
+        <p:nvSpPr>
+          <p:cNvPr id="3" name="Content Placeholder 2">
+            <a:extLst>
+              <a:ext uri="{FF2B5EF4-FFF2-40B4-BE49-F238E27FC236}">
+                <a16:creationId xmlns:a16="http://schemas.microsoft.com/office/drawing/2014/main" id="{7A0D5356-E4EE-4CBE-BB4B-00E939CFD61F}"/>
+              </a:ext>
+            </a:extLst>
+          </p:cNvPr>
+          <p:cNvSpPr>
+            <a:spLocks noGrp="1"/>
+          </p:cNvSpPr>
+          <p:nvPr>
+            <p:ph idx="1"/>
+          </p:nvPr>
+        </p:nvSpPr>
+        <p:spPr/>
+        <p:txBody>
+          <a:bodyPr/>
+          <a:lstStyle/>
+          <a:p>
+            <a:endParaRPr lang="zh-CN" altLang="en-US" dirty="0"/>
+          </a:p>
+          <a:p>
+            <a:endParaRPr lang="zh-CN" altLang="en-US" dirty="0"/>
+          </a:p>
+        </p:txBody>
+      </p:sp>
+      <p:pic>
+        <p:nvPicPr>
+          <p:cNvPr id="5" name="Picture 4" descr="Text&#10;&#10;Description automatically generated with medium confidence">
+            <a:extLst>
+              <a:ext uri="{FF2B5EF4-FFF2-40B4-BE49-F238E27FC236}">
+                <a16:creationId xmlns:a16="http://schemas.microsoft.com/office/drawing/2014/main" id="{84702097-5AC6-481E-AF8D-C4DB6A25FC4D}"/>
+              </a:ext>
+            </a:extLst>
+          </p:cNvPr>
+          <p:cNvPicPr>
+            <a:picLocks noChangeAspect="1"/>
+          </p:cNvPicPr>
+          <p:nvPr/>
+        </p:nvPicPr>
+        <p:blipFill>
+          <a:blip r:embed="rId2">
+            <a:extLst>
+              <a:ext uri="{28A0092B-C50C-407E-A947-70E740481C1C}">
+                <a14:useLocalDpi xmlns:a14="http://schemas.microsoft.com/office/drawing/2010/main" val="0"/>
+              </a:ext>
+            </a:extLst>
+          </a:blip>
+          <a:stretch>
+            <a:fillRect/>
+          </a:stretch>
+        </p:blipFill>
+        <p:spPr>
+          <a:xfrm>
+            <a:off x="5965900" y="2057556"/>
+            <a:ext cx="6555781" cy="4175232"/>
+          </a:xfrm>
+          <a:prstGeom prst="rect">
+            <a:avLst/>
+          </a:prstGeom>
+        </p:spPr>
+      </p:pic>
+      <p:pic>
+        <p:nvPicPr>
+          <p:cNvPr id="7" name="Picture 6">
+            <a:extLst>
+              <a:ext uri="{FF2B5EF4-FFF2-40B4-BE49-F238E27FC236}">
+                <a16:creationId xmlns:a16="http://schemas.microsoft.com/office/drawing/2014/main" id="{BFA941A4-20AF-457F-91B6-0873840B0E3F}"/>
+              </a:ext>
+            </a:extLst>
+          </p:cNvPr>
+          <p:cNvPicPr>
+            <a:picLocks noChangeAspect="1"/>
+          </p:cNvPicPr>
+          <p:nvPr/>
+        </p:nvPicPr>
+        <p:blipFill>
+          <a:blip r:embed="rId3"/>
+          <a:stretch>
+            <a:fillRect/>
+          </a:stretch>
+        </p:blipFill>
+        <p:spPr>
+          <a:xfrm>
+            <a:off x="5476237" y="425495"/>
+            <a:ext cx="2228571" cy="780952"/>
+          </a:xfrm>
+          <a:prstGeom prst="rect">
+            <a:avLst/>
+          </a:prstGeom>
+        </p:spPr>
+      </p:pic>
+      <p:pic>
+        <p:nvPicPr>
+          <p:cNvPr id="9" name="Picture 8">
+            <a:extLst>
+              <a:ext uri="{FF2B5EF4-FFF2-40B4-BE49-F238E27FC236}">
+                <a16:creationId xmlns:a16="http://schemas.microsoft.com/office/drawing/2014/main" id="{16CF4B3C-024F-4C0E-A5C5-1915DF035DAF}"/>
+              </a:ext>
+            </a:extLst>
+          </p:cNvPr>
+          <p:cNvPicPr>
+            <a:picLocks noChangeAspect="1"/>
+          </p:cNvPicPr>
+          <p:nvPr/>
+        </p:nvPicPr>
+        <p:blipFill>
+          <a:blip r:embed="rId4"/>
+          <a:stretch>
+            <a:fillRect/>
+          </a:stretch>
+        </p:blipFill>
+        <p:spPr>
+          <a:xfrm>
+            <a:off x="0" y="2519265"/>
+            <a:ext cx="5724145" cy="3308394"/>
+          </a:xfrm>
+          <a:prstGeom prst="rect">
+            <a:avLst/>
+          </a:prstGeom>
+        </p:spPr>
+      </p:pic>
+    </p:spTree>
+    <p:extLst>
+      <p:ext uri="{BB962C8B-B14F-4D97-AF65-F5344CB8AC3E}">
+        <p14:creationId xmlns:p14="http://schemas.microsoft.com/office/powerpoint/2010/main" val="3288743308"/>
+      </p:ext>
+    </p:extLst>
+  </p:cSld>
+  <p:clrMapOvr>
+    <a:masterClrMapping/>
+  </p:clrMapOvr>
+</p:sld>
+</file>
+
+<file path=ppt/slides/slide8.xml><?xml version="1.0" encoding="utf-8"?>
+<p:sld xmlns:a="http://schemas.openxmlformats.org/drawingml/2006/main" xmlns:r="http://schemas.openxmlformats.org/officeDocument/2006/relationships" xmlns:p="http://schemas.openxmlformats.org/presentationml/2006/main">
+  <p:cSld>
+    <p:spTree>
+      <p:nvGrpSpPr>
+        <p:cNvPr id="1" name=""/>
+        <p:cNvGrpSpPr/>
+        <p:nvPr/>
+      </p:nvGrpSpPr>
+      <p:grpSpPr>
+        <a:xfrm>
+          <a:off x="0" y="0"/>
+          <a:ext cx="0" cy="0"/>
+          <a:chOff x="0" y="0"/>
+          <a:chExt cx="0" cy="0"/>
+        </a:xfrm>
+      </p:grpSpPr>
+      <p:sp>
+        <p:nvSpPr>
+          <p:cNvPr id="2" name="Title 1">
+            <a:extLst>
+              <a:ext uri="{FF2B5EF4-FFF2-40B4-BE49-F238E27FC236}">
+                <a16:creationId xmlns:a16="http://schemas.microsoft.com/office/drawing/2014/main" id="{2E11327B-23B4-4B4D-9509-085FA32EE35C}"/>
+              </a:ext>
+            </a:extLst>
+          </p:cNvPr>
+          <p:cNvSpPr>
+            <a:spLocks noGrp="1"/>
+          </p:cNvSpPr>
+          <p:nvPr>
+            <p:ph type="title"/>
+          </p:nvPr>
+        </p:nvSpPr>
+        <p:spPr/>
+        <p:txBody>
+          <a:bodyPr/>
+          <a:lstStyle/>
+          <a:p>
+            <a:r>
+              <a:rPr lang="en-US" altLang="zh-CN" dirty="0"/>
+              <a:t>Peak list</a:t>
+            </a:r>
+            <a:endParaRPr lang="zh-CN" altLang="en-US" dirty="0"/>
+          </a:p>
+        </p:txBody>
+      </p:sp>
+      <p:sp>
+        <p:nvSpPr>
+          <p:cNvPr id="3" name="Content Placeholder 2">
+            <a:extLst>
+              <a:ext uri="{FF2B5EF4-FFF2-40B4-BE49-F238E27FC236}">
+                <a16:creationId xmlns:a16="http://schemas.microsoft.com/office/drawing/2014/main" id="{52031413-F69F-4048-85E1-23F842A113A2}"/>
+              </a:ext>
+            </a:extLst>
+          </p:cNvPr>
+          <p:cNvSpPr>
+            <a:spLocks noGrp="1"/>
+          </p:cNvSpPr>
+          <p:nvPr>
+            <p:ph idx="1"/>
+          </p:nvPr>
+        </p:nvSpPr>
+        <p:spPr/>
+        <p:txBody>
+          <a:bodyPr/>
+          <a:lstStyle/>
+          <a:p>
+            <a:endParaRPr lang="zh-CN" altLang="en-US"/>
+          </a:p>
+        </p:txBody>
+      </p:sp>
+      <p:pic>
+        <p:nvPicPr>
+          <p:cNvPr id="5" name="Picture 4">
+            <a:extLst>
+              <a:ext uri="{FF2B5EF4-FFF2-40B4-BE49-F238E27FC236}">
+                <a16:creationId xmlns:a16="http://schemas.microsoft.com/office/drawing/2014/main" id="{4F54CE70-E61F-4E87-B1AD-53903325040F}"/>
+              </a:ext>
+            </a:extLst>
+          </p:cNvPr>
+          <p:cNvPicPr>
+            <a:picLocks noChangeAspect="1"/>
+          </p:cNvPicPr>
+          <p:nvPr/>
+        </p:nvPicPr>
+        <p:blipFill>
+          <a:blip r:embed="rId2"/>
+          <a:stretch>
+            <a:fillRect/>
+          </a:stretch>
+        </p:blipFill>
+        <p:spPr>
+          <a:xfrm>
+            <a:off x="2756355" y="0"/>
+            <a:ext cx="6679290" cy="6858000"/>
+          </a:xfrm>
+          <a:prstGeom prst="rect">
+            <a:avLst/>
+          </a:prstGeom>
+        </p:spPr>
+      </p:pic>
+    </p:spTree>
+    <p:extLst>
+      <p:ext uri="{BB962C8B-B14F-4D97-AF65-F5344CB8AC3E}">
+        <p14:creationId xmlns:p14="http://schemas.microsoft.com/office/powerpoint/2010/main" val="445471126"/>
+      </p:ext>
+    </p:extLst>
+  </p:cSld>
+  <p:clrMapOvr>
+    <a:masterClrMapping/>
+  </p:clrMapOvr>
+</p:sld>
+</file>
+
 <file path=ppt/theme/theme1.xml><?xml version="1.0" encoding="utf-8"?>
 <a:theme xmlns:a="http://schemas.openxmlformats.org/drawingml/2006/main" name="Office Theme">
   <a:themeElements>

</xml_diff>

<commit_message>
boolean index update, boost up efficiency by 3 times
</commit_message>
<xml_diff>
--- a/doc/CR-20210202.pptx
+++ b/doc/CR-20210202.pptx
@@ -5,7 +5,7 @@
     <p:sldMasterId id="2147483648" r:id="rId1"/>
   </p:sldMasterIdLst>
   <p:notesMasterIdLst>
-    <p:notesMasterId r:id="rId11"/>
+    <p:notesMasterId r:id="rId13"/>
   </p:notesMasterIdLst>
   <p:sldIdLst>
     <p:sldId id="257" r:id="rId2"/>
@@ -17,6 +17,8 @@
     <p:sldId id="263" r:id="rId8"/>
     <p:sldId id="264" r:id="rId9"/>
     <p:sldId id="265" r:id="rId10"/>
+    <p:sldId id="266" r:id="rId11"/>
+    <p:sldId id="267" r:id="rId12"/>
   </p:sldIdLst>
   <p:sldSz cx="12192000" cy="6858000"/>
   <p:notesSz cx="6858000" cy="9144000"/>
@@ -11030,7 +11032,7 @@
           <a:p>
             <a:fld id="{9F42EE44-86D2-47F2-9C37-987C905F93D9}" type="datetimeFigureOut">
               <a:rPr lang="zh-CN" altLang="en-US" smtClean="0"/>
-              <a:t>2021/2/19</a:t>
+              <a:t>2021/2/22</a:t>
             </a:fld>
             <a:endParaRPr lang="zh-CN" altLang="en-US"/>
           </a:p>
@@ -11531,7 +11533,7 @@
           <a:p>
             <a:fld id="{403374F6-491B-4410-BF99-DF51E2A038AC}" type="datetimeFigureOut">
               <a:rPr lang="zh-CN" altLang="en-US" smtClean="0"/>
-              <a:t>2021/2/19</a:t>
+              <a:t>2021/2/22</a:t>
             </a:fld>
             <a:endParaRPr lang="zh-CN" altLang="en-US"/>
           </a:p>
@@ -11731,7 +11733,7 @@
           <a:p>
             <a:fld id="{403374F6-491B-4410-BF99-DF51E2A038AC}" type="datetimeFigureOut">
               <a:rPr lang="zh-CN" altLang="en-US" smtClean="0"/>
-              <a:t>2021/2/19</a:t>
+              <a:t>2021/2/22</a:t>
             </a:fld>
             <a:endParaRPr lang="zh-CN" altLang="en-US"/>
           </a:p>
@@ -11941,7 +11943,7 @@
           <a:p>
             <a:fld id="{403374F6-491B-4410-BF99-DF51E2A038AC}" type="datetimeFigureOut">
               <a:rPr lang="zh-CN" altLang="en-US" smtClean="0"/>
-              <a:t>2021/2/19</a:t>
+              <a:t>2021/2/22</a:t>
             </a:fld>
             <a:endParaRPr lang="zh-CN" altLang="en-US"/>
           </a:p>
@@ -12141,7 +12143,7 @@
           <a:p>
             <a:fld id="{403374F6-491B-4410-BF99-DF51E2A038AC}" type="datetimeFigureOut">
               <a:rPr lang="zh-CN" altLang="en-US" smtClean="0"/>
-              <a:t>2021/2/19</a:t>
+              <a:t>2021/2/22</a:t>
             </a:fld>
             <a:endParaRPr lang="zh-CN" altLang="en-US"/>
           </a:p>
@@ -12417,7 +12419,7 @@
           <a:p>
             <a:fld id="{403374F6-491B-4410-BF99-DF51E2A038AC}" type="datetimeFigureOut">
               <a:rPr lang="zh-CN" altLang="en-US" smtClean="0"/>
-              <a:t>2021/2/19</a:t>
+              <a:t>2021/2/22</a:t>
             </a:fld>
             <a:endParaRPr lang="zh-CN" altLang="en-US"/>
           </a:p>
@@ -12685,7 +12687,7 @@
           <a:p>
             <a:fld id="{403374F6-491B-4410-BF99-DF51E2A038AC}" type="datetimeFigureOut">
               <a:rPr lang="zh-CN" altLang="en-US" smtClean="0"/>
-              <a:t>2021/2/19</a:t>
+              <a:t>2021/2/22</a:t>
             </a:fld>
             <a:endParaRPr lang="zh-CN" altLang="en-US"/>
           </a:p>
@@ -13100,7 +13102,7 @@
           <a:p>
             <a:fld id="{403374F6-491B-4410-BF99-DF51E2A038AC}" type="datetimeFigureOut">
               <a:rPr lang="zh-CN" altLang="en-US" smtClean="0"/>
-              <a:t>2021/2/19</a:t>
+              <a:t>2021/2/22</a:t>
             </a:fld>
             <a:endParaRPr lang="zh-CN" altLang="en-US"/>
           </a:p>
@@ -13242,7 +13244,7 @@
           <a:p>
             <a:fld id="{403374F6-491B-4410-BF99-DF51E2A038AC}" type="datetimeFigureOut">
               <a:rPr lang="zh-CN" altLang="en-US" smtClean="0"/>
-              <a:t>2021/2/19</a:t>
+              <a:t>2021/2/22</a:t>
             </a:fld>
             <a:endParaRPr lang="zh-CN" altLang="en-US"/>
           </a:p>
@@ -13355,7 +13357,7 @@
           <a:p>
             <a:fld id="{403374F6-491B-4410-BF99-DF51E2A038AC}" type="datetimeFigureOut">
               <a:rPr lang="zh-CN" altLang="en-US" smtClean="0"/>
-              <a:t>2021/2/19</a:t>
+              <a:t>2021/2/22</a:t>
             </a:fld>
             <a:endParaRPr lang="zh-CN" altLang="en-US"/>
           </a:p>
@@ -13668,7 +13670,7 @@
           <a:p>
             <a:fld id="{403374F6-491B-4410-BF99-DF51E2A038AC}" type="datetimeFigureOut">
               <a:rPr lang="zh-CN" altLang="en-US" smtClean="0"/>
-              <a:t>2021/2/19</a:t>
+              <a:t>2021/2/22</a:t>
             </a:fld>
             <a:endParaRPr lang="zh-CN" altLang="en-US"/>
           </a:p>
@@ -13957,7 +13959,7 @@
           <a:p>
             <a:fld id="{403374F6-491B-4410-BF99-DF51E2A038AC}" type="datetimeFigureOut">
               <a:rPr lang="zh-CN" altLang="en-US" smtClean="0"/>
-              <a:t>2021/2/19</a:t>
+              <a:t>2021/2/22</a:t>
             </a:fld>
             <a:endParaRPr lang="zh-CN" altLang="en-US"/>
           </a:p>
@@ -14200,7 +14202,7 @@
           <a:p>
             <a:fld id="{403374F6-491B-4410-BF99-DF51E2A038AC}" type="datetimeFigureOut">
               <a:rPr lang="zh-CN" altLang="en-US" smtClean="0"/>
-              <a:t>2021/2/19</a:t>
+              <a:t>2021/2/22</a:t>
             </a:fld>
             <a:endParaRPr lang="zh-CN" altLang="en-US"/>
           </a:p>
@@ -14731,6 +14733,390 @@
     <p:extLst>
       <p:ext uri="{BB962C8B-B14F-4D97-AF65-F5344CB8AC3E}">
         <p14:creationId xmlns:p14="http://schemas.microsoft.com/office/powerpoint/2010/main" val="655573959"/>
+      </p:ext>
+    </p:extLst>
+  </p:cSld>
+  <p:clrMapOvr>
+    <a:masterClrMapping/>
+  </p:clrMapOvr>
+</p:sld>
+</file>
+
+<file path=ppt/slides/slide10.xml><?xml version="1.0" encoding="utf-8"?>
+<p:sld xmlns:a="http://schemas.openxmlformats.org/drawingml/2006/main" xmlns:r="http://schemas.openxmlformats.org/officeDocument/2006/relationships" xmlns:p="http://schemas.openxmlformats.org/presentationml/2006/main">
+  <p:cSld>
+    <p:spTree>
+      <p:nvGrpSpPr>
+        <p:cNvPr id="1" name=""/>
+        <p:cNvGrpSpPr/>
+        <p:nvPr/>
+      </p:nvGrpSpPr>
+      <p:grpSpPr>
+        <a:xfrm>
+          <a:off x="0" y="0"/>
+          <a:ext cx="0" cy="0"/>
+          <a:chOff x="0" y="0"/>
+          <a:chExt cx="0" cy="0"/>
+        </a:xfrm>
+      </p:grpSpPr>
+      <p:sp>
+        <p:nvSpPr>
+          <p:cNvPr id="2" name="Title 1">
+            <a:extLst>
+              <a:ext uri="{FF2B5EF4-FFF2-40B4-BE49-F238E27FC236}">
+                <a16:creationId xmlns:a16="http://schemas.microsoft.com/office/drawing/2014/main" id="{63D582C7-3082-4687-8C8E-7F290A7B3D43}"/>
+              </a:ext>
+            </a:extLst>
+          </p:cNvPr>
+          <p:cNvSpPr>
+            <a:spLocks noGrp="1"/>
+          </p:cNvSpPr>
+          <p:nvPr>
+            <p:ph type="title"/>
+          </p:nvPr>
+        </p:nvSpPr>
+        <p:spPr/>
+        <p:txBody>
+          <a:bodyPr/>
+          <a:lstStyle/>
+          <a:p>
+            <a:endParaRPr lang="en-US"/>
+          </a:p>
+        </p:txBody>
+      </p:sp>
+      <p:sp>
+        <p:nvSpPr>
+          <p:cNvPr id="3" name="Content Placeholder 2">
+            <a:extLst>
+              <a:ext uri="{FF2B5EF4-FFF2-40B4-BE49-F238E27FC236}">
+                <a16:creationId xmlns:a16="http://schemas.microsoft.com/office/drawing/2014/main" id="{2E32CB27-FB90-4BE4-AD86-7B15E8098132}"/>
+              </a:ext>
+            </a:extLst>
+          </p:cNvPr>
+          <p:cNvSpPr>
+            <a:spLocks noGrp="1"/>
+          </p:cNvSpPr>
+          <p:nvPr>
+            <p:ph idx="1"/>
+          </p:nvPr>
+        </p:nvSpPr>
+        <p:spPr/>
+        <p:txBody>
+          <a:bodyPr/>
+          <a:lstStyle/>
+          <a:p>
+            <a:endParaRPr lang="en-US" dirty="0"/>
+          </a:p>
+        </p:txBody>
+      </p:sp>
+      <p:pic>
+        <p:nvPicPr>
+          <p:cNvPr id="5" name="Picture 4">
+            <a:extLst>
+              <a:ext uri="{FF2B5EF4-FFF2-40B4-BE49-F238E27FC236}">
+                <a16:creationId xmlns:a16="http://schemas.microsoft.com/office/drawing/2014/main" id="{3FBC6C72-C3AB-41F3-8A83-481AE50E9138}"/>
+              </a:ext>
+            </a:extLst>
+          </p:cNvPr>
+          <p:cNvPicPr>
+            <a:picLocks noChangeAspect="1"/>
+          </p:cNvPicPr>
+          <p:nvPr/>
+        </p:nvPicPr>
+        <p:blipFill>
+          <a:blip r:embed="rId2"/>
+          <a:stretch>
+            <a:fillRect/>
+          </a:stretch>
+        </p:blipFill>
+        <p:spPr>
+          <a:xfrm>
+            <a:off x="0" y="0"/>
+            <a:ext cx="6655363" cy="3776358"/>
+          </a:xfrm>
+          <a:prstGeom prst="rect">
+            <a:avLst/>
+          </a:prstGeom>
+        </p:spPr>
+      </p:pic>
+      <p:pic>
+        <p:nvPicPr>
+          <p:cNvPr id="7" name="Picture 6">
+            <a:extLst>
+              <a:ext uri="{FF2B5EF4-FFF2-40B4-BE49-F238E27FC236}">
+                <a16:creationId xmlns:a16="http://schemas.microsoft.com/office/drawing/2014/main" id="{12186EA3-CF32-461C-AC90-BD74A2D70156}"/>
+              </a:ext>
+            </a:extLst>
+          </p:cNvPr>
+          <p:cNvPicPr>
+            <a:picLocks noChangeAspect="1"/>
+          </p:cNvPicPr>
+          <p:nvPr/>
+        </p:nvPicPr>
+        <p:blipFill>
+          <a:blip r:embed="rId3"/>
+          <a:stretch>
+            <a:fillRect/>
+          </a:stretch>
+        </p:blipFill>
+        <p:spPr>
+          <a:xfrm>
+            <a:off x="4610911" y="3846957"/>
+            <a:ext cx="7581089" cy="2957541"/>
+          </a:xfrm>
+          <a:prstGeom prst="rect">
+            <a:avLst/>
+          </a:prstGeom>
+        </p:spPr>
+      </p:pic>
+      <p:sp>
+        <p:nvSpPr>
+          <p:cNvPr id="8" name="Rectangle 7">
+            <a:extLst>
+              <a:ext uri="{FF2B5EF4-FFF2-40B4-BE49-F238E27FC236}">
+                <a16:creationId xmlns:a16="http://schemas.microsoft.com/office/drawing/2014/main" id="{D8C887EA-29F6-4D46-9D52-7023E87BAF83}"/>
+              </a:ext>
+            </a:extLst>
+          </p:cNvPr>
+          <p:cNvSpPr/>
+          <p:nvPr/>
+        </p:nvSpPr>
+        <p:spPr>
+          <a:xfrm>
+            <a:off x="0" y="-97277"/>
+            <a:ext cx="1838528" cy="710120"/>
+          </a:xfrm>
+          <a:prstGeom prst="rect">
+            <a:avLst/>
+          </a:prstGeom>
+          <a:noFill/>
+          <a:ln>
+            <a:solidFill>
+              <a:srgbClr val="FF0000"/>
+            </a:solidFill>
+          </a:ln>
+        </p:spPr>
+        <p:style>
+          <a:lnRef idx="2">
+            <a:schemeClr val="accent1">
+              <a:shade val="50000"/>
+            </a:schemeClr>
+          </a:lnRef>
+          <a:fillRef idx="1">
+            <a:schemeClr val="accent1"/>
+          </a:fillRef>
+          <a:effectRef idx="0">
+            <a:schemeClr val="accent1"/>
+          </a:effectRef>
+          <a:fontRef idx="minor">
+            <a:schemeClr val="lt1"/>
+          </a:fontRef>
+        </p:style>
+        <p:txBody>
+          <a:bodyPr rtlCol="0" anchor="ctr"/>
+          <a:lstStyle/>
+          <a:p>
+            <a:pPr algn="ctr"/>
+            <a:endParaRPr lang="en-US"/>
+          </a:p>
+        </p:txBody>
+      </p:sp>
+      <p:sp>
+        <p:nvSpPr>
+          <p:cNvPr id="9" name="Rectangle 8">
+            <a:extLst>
+              <a:ext uri="{FF2B5EF4-FFF2-40B4-BE49-F238E27FC236}">
+                <a16:creationId xmlns:a16="http://schemas.microsoft.com/office/drawing/2014/main" id="{B62492B5-022F-4D30-9310-351567868253}"/>
+              </a:ext>
+            </a:extLst>
+          </p:cNvPr>
+          <p:cNvSpPr/>
+          <p:nvPr/>
+        </p:nvSpPr>
+        <p:spPr>
+          <a:xfrm>
+            <a:off x="4526437" y="3786423"/>
+            <a:ext cx="1838528" cy="710120"/>
+          </a:xfrm>
+          <a:prstGeom prst="rect">
+            <a:avLst/>
+          </a:prstGeom>
+          <a:noFill/>
+          <a:ln>
+            <a:solidFill>
+              <a:srgbClr val="FF0000"/>
+            </a:solidFill>
+          </a:ln>
+        </p:spPr>
+        <p:style>
+          <a:lnRef idx="2">
+            <a:schemeClr val="accent1">
+              <a:shade val="50000"/>
+            </a:schemeClr>
+          </a:lnRef>
+          <a:fillRef idx="1">
+            <a:schemeClr val="accent1"/>
+          </a:fillRef>
+          <a:effectRef idx="0">
+            <a:schemeClr val="accent1"/>
+          </a:effectRef>
+          <a:fontRef idx="minor">
+            <a:schemeClr val="lt1"/>
+          </a:fontRef>
+        </p:style>
+        <p:txBody>
+          <a:bodyPr rtlCol="0" anchor="ctr"/>
+          <a:lstStyle/>
+          <a:p>
+            <a:pPr algn="ctr"/>
+            <a:endParaRPr lang="en-US"/>
+          </a:p>
+        </p:txBody>
+      </p:sp>
+    </p:spTree>
+    <p:extLst>
+      <p:ext uri="{BB962C8B-B14F-4D97-AF65-F5344CB8AC3E}">
+        <p14:creationId xmlns:p14="http://schemas.microsoft.com/office/powerpoint/2010/main" val="2471396295"/>
+      </p:ext>
+    </p:extLst>
+  </p:cSld>
+  <p:clrMapOvr>
+    <a:masterClrMapping/>
+  </p:clrMapOvr>
+</p:sld>
+</file>
+
+<file path=ppt/slides/slide11.xml><?xml version="1.0" encoding="utf-8"?>
+<p:sld xmlns:a="http://schemas.openxmlformats.org/drawingml/2006/main" xmlns:r="http://schemas.openxmlformats.org/officeDocument/2006/relationships" xmlns:p="http://schemas.openxmlformats.org/presentationml/2006/main">
+  <p:cSld>
+    <p:spTree>
+      <p:nvGrpSpPr>
+        <p:cNvPr id="1" name=""/>
+        <p:cNvGrpSpPr/>
+        <p:nvPr/>
+      </p:nvGrpSpPr>
+      <p:grpSpPr>
+        <a:xfrm>
+          <a:off x="0" y="0"/>
+          <a:ext cx="0" cy="0"/>
+          <a:chOff x="0" y="0"/>
+          <a:chExt cx="0" cy="0"/>
+        </a:xfrm>
+      </p:grpSpPr>
+      <p:sp>
+        <p:nvSpPr>
+          <p:cNvPr id="2" name="Title 1">
+            <a:extLst>
+              <a:ext uri="{FF2B5EF4-FFF2-40B4-BE49-F238E27FC236}">
+                <a16:creationId xmlns:a16="http://schemas.microsoft.com/office/drawing/2014/main" id="{6FD13D82-5821-4B9F-BD3C-2B1586860B92}"/>
+              </a:ext>
+            </a:extLst>
+          </p:cNvPr>
+          <p:cNvSpPr>
+            <a:spLocks noGrp="1"/>
+          </p:cNvSpPr>
+          <p:nvPr>
+            <p:ph type="title"/>
+          </p:nvPr>
+        </p:nvSpPr>
+        <p:spPr/>
+        <p:txBody>
+          <a:bodyPr/>
+          <a:lstStyle/>
+          <a:p>
+            <a:endParaRPr lang="en-US"/>
+          </a:p>
+        </p:txBody>
+      </p:sp>
+      <p:sp>
+        <p:nvSpPr>
+          <p:cNvPr id="3" name="Content Placeholder 2">
+            <a:extLst>
+              <a:ext uri="{FF2B5EF4-FFF2-40B4-BE49-F238E27FC236}">
+                <a16:creationId xmlns:a16="http://schemas.microsoft.com/office/drawing/2014/main" id="{7873B32B-C0A0-40D2-8646-93F849065103}"/>
+              </a:ext>
+            </a:extLst>
+          </p:cNvPr>
+          <p:cNvSpPr>
+            <a:spLocks noGrp="1"/>
+          </p:cNvSpPr>
+          <p:nvPr>
+            <p:ph idx="1"/>
+          </p:nvPr>
+        </p:nvSpPr>
+        <p:spPr/>
+        <p:txBody>
+          <a:bodyPr/>
+          <a:lstStyle/>
+          <a:p>
+            <a:endParaRPr lang="en-US" dirty="0"/>
+          </a:p>
+        </p:txBody>
+      </p:sp>
+      <p:pic>
+        <p:nvPicPr>
+          <p:cNvPr id="5" name="Picture 4">
+            <a:extLst>
+              <a:ext uri="{FF2B5EF4-FFF2-40B4-BE49-F238E27FC236}">
+                <a16:creationId xmlns:a16="http://schemas.microsoft.com/office/drawing/2014/main" id="{4EB7A091-1702-439F-A7FC-8BC852E71C6B}"/>
+              </a:ext>
+            </a:extLst>
+          </p:cNvPr>
+          <p:cNvPicPr>
+            <a:picLocks noChangeAspect="1"/>
+          </p:cNvPicPr>
+          <p:nvPr/>
+        </p:nvPicPr>
+        <p:blipFill>
+          <a:blip r:embed="rId2"/>
+          <a:stretch>
+            <a:fillRect/>
+          </a:stretch>
+        </p:blipFill>
+        <p:spPr>
+          <a:xfrm>
+            <a:off x="0" y="0"/>
+            <a:ext cx="6478621" cy="3885826"/>
+          </a:xfrm>
+          <a:prstGeom prst="rect">
+            <a:avLst/>
+          </a:prstGeom>
+        </p:spPr>
+      </p:pic>
+      <p:pic>
+        <p:nvPicPr>
+          <p:cNvPr id="7" name="Picture 6">
+            <a:extLst>
+              <a:ext uri="{FF2B5EF4-FFF2-40B4-BE49-F238E27FC236}">
+                <a16:creationId xmlns:a16="http://schemas.microsoft.com/office/drawing/2014/main" id="{EC51FB25-6F56-4DB0-A397-FB0AB81AF07B}"/>
+              </a:ext>
+            </a:extLst>
+          </p:cNvPr>
+          <p:cNvPicPr>
+            <a:picLocks noChangeAspect="1"/>
+          </p:cNvPicPr>
+          <p:nvPr/>
+        </p:nvPicPr>
+        <p:blipFill>
+          <a:blip r:embed="rId3"/>
+          <a:stretch>
+            <a:fillRect/>
+          </a:stretch>
+        </p:blipFill>
+        <p:spPr>
+          <a:xfrm>
+            <a:off x="5836596" y="3535305"/>
+            <a:ext cx="6355404" cy="3406834"/>
+          </a:xfrm>
+          <a:prstGeom prst="rect">
+            <a:avLst/>
+          </a:prstGeom>
+        </p:spPr>
+      </p:pic>
+    </p:spTree>
+    <p:extLst>
+      <p:ext uri="{BB962C8B-B14F-4D97-AF65-F5344CB8AC3E}">
+        <p14:creationId xmlns:p14="http://schemas.microsoft.com/office/powerpoint/2010/main" val="1444235832"/>
       </p:ext>
     </p:extLst>
   </p:cSld>

</xml_diff>

<commit_message>
source pattern rec trail
</commit_message>
<xml_diff>
--- a/doc/CR-20210202.pptx
+++ b/doc/CR-20210202.pptx
@@ -5,7 +5,7 @@
     <p:sldMasterId id="2147483648" r:id="rId1"/>
   </p:sldMasterIdLst>
   <p:notesMasterIdLst>
-    <p:notesMasterId r:id="rId16"/>
+    <p:notesMasterId r:id="rId20"/>
   </p:notesMasterIdLst>
   <p:sldIdLst>
     <p:sldId id="257" r:id="rId2"/>
@@ -22,6 +22,10 @@
     <p:sldId id="267" r:id="rId13"/>
     <p:sldId id="269" r:id="rId14"/>
     <p:sldId id="270" r:id="rId15"/>
+    <p:sldId id="271" r:id="rId16"/>
+    <p:sldId id="272" r:id="rId17"/>
+    <p:sldId id="273" r:id="rId18"/>
+    <p:sldId id="274" r:id="rId19"/>
   </p:sldIdLst>
   <p:sldSz cx="12192000" cy="6858000"/>
   <p:notesSz cx="6858000" cy="9144000"/>
@@ -15878,7 +15882,7 @@
           <a:p>
             <a:fld id="{9F42EE44-86D2-47F2-9C37-987C905F93D9}" type="datetimeFigureOut">
               <a:rPr lang="zh-CN" altLang="en-US" smtClean="0"/>
-              <a:t>2021/2/24</a:t>
+              <a:t>2021/3/2</a:t>
             </a:fld>
             <a:endParaRPr lang="zh-CN" altLang="en-US"/>
           </a:p>
@@ -16463,7 +16467,7 @@
           <a:p>
             <a:fld id="{403374F6-491B-4410-BF99-DF51E2A038AC}" type="datetimeFigureOut">
               <a:rPr lang="zh-CN" altLang="en-US" smtClean="0"/>
-              <a:t>2021/2/24</a:t>
+              <a:t>2021/3/2</a:t>
             </a:fld>
             <a:endParaRPr lang="zh-CN" altLang="en-US"/>
           </a:p>
@@ -16663,7 +16667,7 @@
           <a:p>
             <a:fld id="{403374F6-491B-4410-BF99-DF51E2A038AC}" type="datetimeFigureOut">
               <a:rPr lang="zh-CN" altLang="en-US" smtClean="0"/>
-              <a:t>2021/2/24</a:t>
+              <a:t>2021/3/2</a:t>
             </a:fld>
             <a:endParaRPr lang="zh-CN" altLang="en-US"/>
           </a:p>
@@ -16873,7 +16877,7 @@
           <a:p>
             <a:fld id="{403374F6-491B-4410-BF99-DF51E2A038AC}" type="datetimeFigureOut">
               <a:rPr lang="zh-CN" altLang="en-US" smtClean="0"/>
-              <a:t>2021/2/24</a:t>
+              <a:t>2021/3/2</a:t>
             </a:fld>
             <a:endParaRPr lang="zh-CN" altLang="en-US"/>
           </a:p>
@@ -17073,7 +17077,7 @@
           <a:p>
             <a:fld id="{403374F6-491B-4410-BF99-DF51E2A038AC}" type="datetimeFigureOut">
               <a:rPr lang="zh-CN" altLang="en-US" smtClean="0"/>
-              <a:t>2021/2/24</a:t>
+              <a:t>2021/3/2</a:t>
             </a:fld>
             <a:endParaRPr lang="zh-CN" altLang="en-US"/>
           </a:p>
@@ -17349,7 +17353,7 @@
           <a:p>
             <a:fld id="{403374F6-491B-4410-BF99-DF51E2A038AC}" type="datetimeFigureOut">
               <a:rPr lang="zh-CN" altLang="en-US" smtClean="0"/>
-              <a:t>2021/2/24</a:t>
+              <a:t>2021/3/2</a:t>
             </a:fld>
             <a:endParaRPr lang="zh-CN" altLang="en-US"/>
           </a:p>
@@ -17617,7 +17621,7 @@
           <a:p>
             <a:fld id="{403374F6-491B-4410-BF99-DF51E2A038AC}" type="datetimeFigureOut">
               <a:rPr lang="zh-CN" altLang="en-US" smtClean="0"/>
-              <a:t>2021/2/24</a:t>
+              <a:t>2021/3/2</a:t>
             </a:fld>
             <a:endParaRPr lang="zh-CN" altLang="en-US"/>
           </a:p>
@@ -18032,7 +18036,7 @@
           <a:p>
             <a:fld id="{403374F6-491B-4410-BF99-DF51E2A038AC}" type="datetimeFigureOut">
               <a:rPr lang="zh-CN" altLang="en-US" smtClean="0"/>
-              <a:t>2021/2/24</a:t>
+              <a:t>2021/3/2</a:t>
             </a:fld>
             <a:endParaRPr lang="zh-CN" altLang="en-US"/>
           </a:p>
@@ -18174,7 +18178,7 @@
           <a:p>
             <a:fld id="{403374F6-491B-4410-BF99-DF51E2A038AC}" type="datetimeFigureOut">
               <a:rPr lang="zh-CN" altLang="en-US" smtClean="0"/>
-              <a:t>2021/2/24</a:t>
+              <a:t>2021/3/2</a:t>
             </a:fld>
             <a:endParaRPr lang="zh-CN" altLang="en-US"/>
           </a:p>
@@ -18287,7 +18291,7 @@
           <a:p>
             <a:fld id="{403374F6-491B-4410-BF99-DF51E2A038AC}" type="datetimeFigureOut">
               <a:rPr lang="zh-CN" altLang="en-US" smtClean="0"/>
-              <a:t>2021/2/24</a:t>
+              <a:t>2021/3/2</a:t>
             </a:fld>
             <a:endParaRPr lang="zh-CN" altLang="en-US"/>
           </a:p>
@@ -18600,7 +18604,7 @@
           <a:p>
             <a:fld id="{403374F6-491B-4410-BF99-DF51E2A038AC}" type="datetimeFigureOut">
               <a:rPr lang="zh-CN" altLang="en-US" smtClean="0"/>
-              <a:t>2021/2/24</a:t>
+              <a:t>2021/3/2</a:t>
             </a:fld>
             <a:endParaRPr lang="zh-CN" altLang="en-US"/>
           </a:p>
@@ -18889,7 +18893,7 @@
           <a:p>
             <a:fld id="{403374F6-491B-4410-BF99-DF51E2A038AC}" type="datetimeFigureOut">
               <a:rPr lang="zh-CN" altLang="en-US" smtClean="0"/>
-              <a:t>2021/2/24</a:t>
+              <a:t>2021/3/2</a:t>
             </a:fld>
             <a:endParaRPr lang="zh-CN" altLang="en-US"/>
           </a:p>
@@ -19132,7 +19136,7 @@
           <a:p>
             <a:fld id="{403374F6-491B-4410-BF99-DF51E2A038AC}" type="datetimeFigureOut">
               <a:rPr lang="zh-CN" altLang="en-US" smtClean="0"/>
-              <a:t>2021/2/24</a:t>
+              <a:t>2021/3/2</a:t>
             </a:fld>
             <a:endParaRPr lang="zh-CN" altLang="en-US"/>
           </a:p>
@@ -20566,6 +20570,930 @@
     <p:extLst>
       <p:ext uri="{BB962C8B-B14F-4D97-AF65-F5344CB8AC3E}">
         <p14:creationId xmlns:p14="http://schemas.microsoft.com/office/powerpoint/2010/main" val="1483251866"/>
+      </p:ext>
+    </p:extLst>
+  </p:cSld>
+  <p:clrMapOvr>
+    <a:masterClrMapping/>
+  </p:clrMapOvr>
+</p:sld>
+</file>
+
+<file path=ppt/slides/slide15.xml><?xml version="1.0" encoding="utf-8"?>
+<p:sld xmlns:a="http://schemas.openxmlformats.org/drawingml/2006/main" xmlns:r="http://schemas.openxmlformats.org/officeDocument/2006/relationships" xmlns:p="http://schemas.openxmlformats.org/presentationml/2006/main">
+  <p:cSld>
+    <p:spTree>
+      <p:nvGrpSpPr>
+        <p:cNvPr id="1" name=""/>
+        <p:cNvGrpSpPr/>
+        <p:nvPr/>
+      </p:nvGrpSpPr>
+      <p:grpSpPr>
+        <a:xfrm>
+          <a:off x="0" y="0"/>
+          <a:ext cx="0" cy="0"/>
+          <a:chOff x="0" y="0"/>
+          <a:chExt cx="0" cy="0"/>
+        </a:xfrm>
+      </p:grpSpPr>
+      <p:sp>
+        <p:nvSpPr>
+          <p:cNvPr id="2" name="Title 1">
+            <a:extLst>
+              <a:ext uri="{FF2B5EF4-FFF2-40B4-BE49-F238E27FC236}">
+                <a16:creationId xmlns:a16="http://schemas.microsoft.com/office/drawing/2014/main" id="{FA89919A-8456-4C4E-8BA5-3FC1C6DA42DD}"/>
+              </a:ext>
+            </a:extLst>
+          </p:cNvPr>
+          <p:cNvSpPr>
+            <a:spLocks noGrp="1"/>
+          </p:cNvSpPr>
+          <p:nvPr>
+            <p:ph type="title"/>
+          </p:nvPr>
+        </p:nvSpPr>
+        <p:spPr/>
+        <p:txBody>
+          <a:bodyPr/>
+          <a:lstStyle/>
+          <a:p>
+            <a:r>
+              <a:rPr lang="en-US" dirty="0"/>
+              <a:t>Dummy data</a:t>
+            </a:r>
+          </a:p>
+        </p:txBody>
+      </p:sp>
+      <p:sp>
+        <p:nvSpPr>
+          <p:cNvPr id="3" name="Content Placeholder 2">
+            <a:extLst>
+              <a:ext uri="{FF2B5EF4-FFF2-40B4-BE49-F238E27FC236}">
+                <a16:creationId xmlns:a16="http://schemas.microsoft.com/office/drawing/2014/main" id="{9E4F042D-4CDF-48FC-8DB0-51D8C2301F34}"/>
+              </a:ext>
+            </a:extLst>
+          </p:cNvPr>
+          <p:cNvSpPr>
+            <a:spLocks noGrp="1"/>
+          </p:cNvSpPr>
+          <p:nvPr>
+            <p:ph idx="1"/>
+          </p:nvPr>
+        </p:nvSpPr>
+        <p:spPr>
+          <a:xfrm>
+            <a:off x="838200" y="1858282"/>
+            <a:ext cx="4332514" cy="4351338"/>
+          </a:xfrm>
+        </p:spPr>
+        <p:txBody>
+          <a:bodyPr>
+            <a:normAutofit fontScale="92500" lnSpcReduction="20000"/>
+          </a:bodyPr>
+          <a:lstStyle/>
+          <a:p>
+            <a:r>
+              <a:rPr lang="en-US" dirty="0"/>
+              <a:t>Follow the previous dataset distribution</a:t>
+            </a:r>
+          </a:p>
+          <a:p>
+            <a:r>
+              <a:rPr lang="en-US" dirty="0"/>
+              <a:t>Covers simple matrix (ozonation experiment dilution) and complex matrix(field samples)</a:t>
+            </a:r>
+          </a:p>
+          <a:p>
+            <a:r>
+              <a:rPr lang="en-US" dirty="0"/>
+              <a:t>Dummy source: random 200 </a:t>
+            </a:r>
+            <a:r>
+              <a:rPr lang="en-US" dirty="0" err="1"/>
+              <a:t>fea</a:t>
+            </a:r>
+            <a:endParaRPr lang="en-US" dirty="0"/>
+          </a:p>
+          <a:p>
+            <a:r>
+              <a:rPr lang="en-US" dirty="0"/>
+              <a:t>Dummy background: random 10000 </a:t>
+            </a:r>
+            <a:r>
+              <a:rPr lang="en-US" dirty="0" err="1"/>
+              <a:t>mz</a:t>
+            </a:r>
+            <a:r>
+              <a:rPr lang="en-US" dirty="0"/>
+              <a:t>/rt pairs </a:t>
+            </a:r>
+          </a:p>
+          <a:p>
+            <a:r>
+              <a:rPr lang="en-US" dirty="0"/>
+              <a:t>So far, only up to 2D (intensity didn’t included)</a:t>
+            </a:r>
+          </a:p>
+        </p:txBody>
+      </p:sp>
+      <p:pic>
+        <p:nvPicPr>
+          <p:cNvPr id="1026" name="Picture 2">
+            <a:extLst>
+              <a:ext uri="{FF2B5EF4-FFF2-40B4-BE49-F238E27FC236}">
+                <a16:creationId xmlns:a16="http://schemas.microsoft.com/office/drawing/2014/main" id="{BE1A370D-8CEC-44FE-940E-9DA056217C51}"/>
+              </a:ext>
+            </a:extLst>
+          </p:cNvPr>
+          <p:cNvPicPr>
+            <a:picLocks noChangeAspect="1" noChangeArrowheads="1"/>
+          </p:cNvPicPr>
+          <p:nvPr/>
+        </p:nvPicPr>
+        <p:blipFill>
+          <a:blip r:embed="rId2">
+            <a:extLst>
+              <a:ext uri="{28A0092B-C50C-407E-A947-70E740481C1C}">
+                <a14:useLocalDpi xmlns:a14="http://schemas.microsoft.com/office/drawing/2010/main" val="0"/>
+              </a:ext>
+            </a:extLst>
+          </a:blip>
+          <a:srcRect/>
+          <a:stretch>
+            <a:fillRect/>
+          </a:stretch>
+        </p:blipFill>
+        <p:spPr bwMode="auto">
+          <a:xfrm>
+            <a:off x="5057775" y="219755"/>
+            <a:ext cx="3600450" cy="2362200"/>
+          </a:xfrm>
+          <a:prstGeom prst="rect">
+            <a:avLst/>
+          </a:prstGeom>
+          <a:noFill/>
+          <a:extLst>
+            <a:ext uri="{909E8E84-426E-40DD-AFC4-6F175D3DCCD1}">
+              <a14:hiddenFill xmlns:a14="http://schemas.microsoft.com/office/drawing/2010/main">
+                <a:solidFill>
+                  <a:srgbClr val="FFFFFF"/>
+                </a:solidFill>
+              </a14:hiddenFill>
+            </a:ext>
+          </a:extLst>
+        </p:spPr>
+      </p:pic>
+      <p:pic>
+        <p:nvPicPr>
+          <p:cNvPr id="1028" name="Picture 4">
+            <a:extLst>
+              <a:ext uri="{FF2B5EF4-FFF2-40B4-BE49-F238E27FC236}">
+                <a16:creationId xmlns:a16="http://schemas.microsoft.com/office/drawing/2014/main" id="{3AE8B4BD-637A-425A-BEE5-361277F0808C}"/>
+              </a:ext>
+            </a:extLst>
+          </p:cNvPr>
+          <p:cNvPicPr>
+            <a:picLocks noChangeAspect="1" noChangeArrowheads="1"/>
+          </p:cNvPicPr>
+          <p:nvPr/>
+        </p:nvPicPr>
+        <p:blipFill>
+          <a:blip r:embed="rId3">
+            <a:extLst>
+              <a:ext uri="{28A0092B-C50C-407E-A947-70E740481C1C}">
+                <a14:useLocalDpi xmlns:a14="http://schemas.microsoft.com/office/drawing/2010/main" val="0"/>
+              </a:ext>
+            </a:extLst>
+          </a:blip>
+          <a:srcRect/>
+          <a:stretch>
+            <a:fillRect/>
+          </a:stretch>
+        </p:blipFill>
+        <p:spPr bwMode="auto">
+          <a:xfrm>
+            <a:off x="8780690" y="134030"/>
+            <a:ext cx="3714750" cy="2533650"/>
+          </a:xfrm>
+          <a:prstGeom prst="rect">
+            <a:avLst/>
+          </a:prstGeom>
+          <a:noFill/>
+          <a:extLst>
+            <a:ext uri="{909E8E84-426E-40DD-AFC4-6F175D3DCCD1}">
+              <a14:hiddenFill xmlns:a14="http://schemas.microsoft.com/office/drawing/2010/main">
+                <a:solidFill>
+                  <a:srgbClr val="FFFFFF"/>
+                </a:solidFill>
+              </a14:hiddenFill>
+            </a:ext>
+          </a:extLst>
+        </p:spPr>
+      </p:pic>
+      <p:pic>
+        <p:nvPicPr>
+          <p:cNvPr id="5" name="Picture 4" descr="Text&#10;&#10;Description automatically generated">
+            <a:extLst>
+              <a:ext uri="{FF2B5EF4-FFF2-40B4-BE49-F238E27FC236}">
+                <a16:creationId xmlns:a16="http://schemas.microsoft.com/office/drawing/2014/main" id="{4E6E8C05-3532-4450-8804-1670538D0426}"/>
+              </a:ext>
+            </a:extLst>
+          </p:cNvPr>
+          <p:cNvPicPr>
+            <a:picLocks noChangeAspect="1"/>
+          </p:cNvPicPr>
+          <p:nvPr/>
+        </p:nvPicPr>
+        <p:blipFill>
+          <a:blip r:embed="rId4">
+            <a:extLst>
+              <a:ext uri="{28A0092B-C50C-407E-A947-70E740481C1C}">
+                <a14:useLocalDpi xmlns:a14="http://schemas.microsoft.com/office/drawing/2010/main" val="0"/>
+              </a:ext>
+            </a:extLst>
+          </a:blip>
+          <a:stretch>
+            <a:fillRect/>
+          </a:stretch>
+        </p:blipFill>
+        <p:spPr>
+          <a:xfrm>
+            <a:off x="6666820" y="2581955"/>
+            <a:ext cx="4105275" cy="4038600"/>
+          </a:xfrm>
+          <a:prstGeom prst="rect">
+            <a:avLst/>
+          </a:prstGeom>
+        </p:spPr>
+      </p:pic>
+    </p:spTree>
+    <p:extLst>
+      <p:ext uri="{BB962C8B-B14F-4D97-AF65-F5344CB8AC3E}">
+        <p14:creationId xmlns:p14="http://schemas.microsoft.com/office/powerpoint/2010/main" val="1748285377"/>
+      </p:ext>
+    </p:extLst>
+  </p:cSld>
+  <p:clrMapOvr>
+    <a:masterClrMapping/>
+  </p:clrMapOvr>
+</p:sld>
+</file>
+
+<file path=ppt/slides/slide16.xml><?xml version="1.0" encoding="utf-8"?>
+<p:sld xmlns:a="http://schemas.openxmlformats.org/drawingml/2006/main" xmlns:r="http://schemas.openxmlformats.org/officeDocument/2006/relationships" xmlns:p="http://schemas.openxmlformats.org/presentationml/2006/main">
+  <p:cSld>
+    <p:spTree>
+      <p:nvGrpSpPr>
+        <p:cNvPr id="1" name=""/>
+        <p:cNvGrpSpPr/>
+        <p:nvPr/>
+      </p:nvGrpSpPr>
+      <p:grpSpPr>
+        <a:xfrm>
+          <a:off x="0" y="0"/>
+          <a:ext cx="0" cy="0"/>
+          <a:chOff x="0" y="0"/>
+          <a:chExt cx="0" cy="0"/>
+        </a:xfrm>
+      </p:grpSpPr>
+      <p:sp>
+        <p:nvSpPr>
+          <p:cNvPr id="2" name="Title 1">
+            <a:extLst>
+              <a:ext uri="{FF2B5EF4-FFF2-40B4-BE49-F238E27FC236}">
+                <a16:creationId xmlns:a16="http://schemas.microsoft.com/office/drawing/2014/main" id="{89E25988-4FBD-4BCE-8145-92C6CED86115}"/>
+              </a:ext>
+            </a:extLst>
+          </p:cNvPr>
+          <p:cNvSpPr>
+            <a:spLocks noGrp="1"/>
+          </p:cNvSpPr>
+          <p:nvPr>
+            <p:ph type="title"/>
+          </p:nvPr>
+        </p:nvSpPr>
+        <p:spPr/>
+        <p:txBody>
+          <a:bodyPr/>
+          <a:lstStyle/>
+          <a:p>
+            <a:r>
+              <a:rPr lang="en-US" dirty="0"/>
+              <a:t>Source identification strategy</a:t>
+            </a:r>
+          </a:p>
+        </p:txBody>
+      </p:sp>
+      <p:sp>
+        <p:nvSpPr>
+          <p:cNvPr id="3" name="Content Placeholder 2">
+            <a:extLst>
+              <a:ext uri="{FF2B5EF4-FFF2-40B4-BE49-F238E27FC236}">
+                <a16:creationId xmlns:a16="http://schemas.microsoft.com/office/drawing/2014/main" id="{43B3D171-1D2D-4B02-B4AA-561F7D3825F5}"/>
+              </a:ext>
+            </a:extLst>
+          </p:cNvPr>
+          <p:cNvSpPr>
+            <a:spLocks noGrp="1"/>
+          </p:cNvSpPr>
+          <p:nvPr>
+            <p:ph idx="1"/>
+          </p:nvPr>
+        </p:nvSpPr>
+        <p:spPr>
+          <a:xfrm>
+            <a:off x="210128" y="1825625"/>
+            <a:ext cx="8026173" cy="4351338"/>
+          </a:xfrm>
+        </p:spPr>
+        <p:txBody>
+          <a:bodyPr/>
+          <a:lstStyle/>
+          <a:p>
+            <a:r>
+              <a:rPr lang="en-US" dirty="0"/>
+              <a:t>Based only on </a:t>
+            </a:r>
+            <a:r>
+              <a:rPr lang="en-US" dirty="0" err="1"/>
+              <a:t>mz</a:t>
+            </a:r>
+            <a:r>
+              <a:rPr lang="en-US" dirty="0"/>
+              <a:t>/rt pair</a:t>
+            </a:r>
+          </a:p>
+          <a:p>
+            <a:pPr lvl="1"/>
+            <a:r>
+              <a:rPr lang="en-US" dirty="0"/>
+              <a:t>From data</a:t>
+            </a:r>
+          </a:p>
+          <a:p>
+            <a:pPr marL="1371600" lvl="2" indent="-457200">
+              <a:buFont typeface="+mj-lt"/>
+              <a:buAutoNum type="arabicPeriod"/>
+            </a:pPr>
+            <a:r>
+              <a:rPr lang="en-US" dirty="0"/>
+              <a:t>Pick up fingerprint features (clustering, regression)</a:t>
+            </a:r>
+          </a:p>
+          <a:p>
+            <a:pPr marL="1371600" lvl="2" indent="-457200">
+              <a:buFont typeface="+mj-lt"/>
+              <a:buAutoNum type="arabicPeriod"/>
+            </a:pPr>
+            <a:r>
+              <a:rPr lang="en-US" dirty="0"/>
+              <a:t>Alignment between fingerprint and field samples</a:t>
+            </a:r>
+          </a:p>
+          <a:p>
+            <a:pPr marL="1371600" lvl="2" indent="-457200">
+              <a:buFont typeface="+mj-lt"/>
+              <a:buAutoNum type="arabicPeriod"/>
+            </a:pPr>
+            <a:r>
+              <a:rPr lang="en-US" dirty="0"/>
+              <a:t>Assess a match score (cos similarity/</a:t>
+            </a:r>
+            <a:r>
+              <a:rPr lang="en-US" dirty="0" err="1"/>
+              <a:t>msdial</a:t>
+            </a:r>
+            <a:r>
+              <a:rPr lang="en-US" dirty="0"/>
+              <a:t> algorithm) and coverage</a:t>
+            </a:r>
+          </a:p>
+          <a:p>
+            <a:pPr marL="1371600" lvl="2" indent="-457200">
+              <a:buFont typeface="+mj-lt"/>
+              <a:buAutoNum type="arabicPeriod"/>
+            </a:pPr>
+            <a:r>
+              <a:rPr lang="en-US" dirty="0"/>
+              <a:t>If score/coverage lower than threshold, check for the shift</a:t>
+            </a:r>
+          </a:p>
+          <a:p>
+            <a:pPr marL="1371600" lvl="2" indent="-457200">
+              <a:buFont typeface="+mj-lt"/>
+              <a:buAutoNum type="arabicPeriod"/>
+            </a:pPr>
+            <a:r>
+              <a:rPr lang="en-US" dirty="0"/>
+              <a:t>Use relative position to reinforce the confidence</a:t>
+            </a:r>
+          </a:p>
+          <a:p>
+            <a:pPr marL="1371600" lvl="2" indent="-457200">
+              <a:buFont typeface="+mj-lt"/>
+              <a:buAutoNum type="arabicPeriod"/>
+            </a:pPr>
+            <a:endParaRPr lang="en-US" dirty="0"/>
+          </a:p>
+          <a:p>
+            <a:pPr lvl="1"/>
+            <a:r>
+              <a:rPr lang="en-US" dirty="0"/>
+              <a:t>From graph</a:t>
+            </a:r>
+          </a:p>
+          <a:p>
+            <a:pPr lvl="2"/>
+            <a:r>
+              <a:rPr lang="en-US" dirty="0"/>
+              <a:t>Undirected network?</a:t>
+            </a:r>
+          </a:p>
+          <a:p>
+            <a:pPr lvl="2"/>
+            <a:r>
+              <a:rPr lang="en-US" dirty="0"/>
+              <a:t>Pattern match?</a:t>
+            </a:r>
+          </a:p>
+        </p:txBody>
+      </p:sp>
+      <p:pic>
+        <p:nvPicPr>
+          <p:cNvPr id="2050" name="Picture 2">
+            <a:extLst>
+              <a:ext uri="{FF2B5EF4-FFF2-40B4-BE49-F238E27FC236}">
+                <a16:creationId xmlns:a16="http://schemas.microsoft.com/office/drawing/2014/main" id="{A2CB6021-F0AD-4FE0-8933-02533C0F588C}"/>
+              </a:ext>
+            </a:extLst>
+          </p:cNvPr>
+          <p:cNvPicPr>
+            <a:picLocks noChangeAspect="1" noChangeArrowheads="1"/>
+          </p:cNvPicPr>
+          <p:nvPr/>
+        </p:nvPicPr>
+        <p:blipFill>
+          <a:blip r:embed="rId2">
+            <a:extLst>
+              <a:ext uri="{28A0092B-C50C-407E-A947-70E740481C1C}">
+                <a14:useLocalDpi xmlns:a14="http://schemas.microsoft.com/office/drawing/2010/main" val="0"/>
+              </a:ext>
+            </a:extLst>
+          </a:blip>
+          <a:srcRect/>
+          <a:stretch>
+            <a:fillRect/>
+          </a:stretch>
+        </p:blipFill>
+        <p:spPr bwMode="auto">
+          <a:xfrm>
+            <a:off x="8701242" y="59871"/>
+            <a:ext cx="3345944" cy="2177937"/>
+          </a:xfrm>
+          <a:prstGeom prst="rect">
+            <a:avLst/>
+          </a:prstGeom>
+          <a:noFill/>
+          <a:extLst>
+            <a:ext uri="{909E8E84-426E-40DD-AFC4-6F175D3DCCD1}">
+              <a14:hiddenFill xmlns:a14="http://schemas.microsoft.com/office/drawing/2010/main">
+                <a:solidFill>
+                  <a:srgbClr val="FFFFFF"/>
+                </a:solidFill>
+              </a14:hiddenFill>
+            </a:ext>
+          </a:extLst>
+        </p:spPr>
+      </p:pic>
+      <p:pic>
+        <p:nvPicPr>
+          <p:cNvPr id="2052" name="Picture 4">
+            <a:extLst>
+              <a:ext uri="{FF2B5EF4-FFF2-40B4-BE49-F238E27FC236}">
+                <a16:creationId xmlns:a16="http://schemas.microsoft.com/office/drawing/2014/main" id="{E13BCA6E-7DA4-4DAC-8640-983DE3D9B9ED}"/>
+              </a:ext>
+            </a:extLst>
+          </p:cNvPr>
+          <p:cNvPicPr>
+            <a:picLocks noChangeAspect="1" noChangeArrowheads="1"/>
+          </p:cNvPicPr>
+          <p:nvPr/>
+        </p:nvPicPr>
+        <p:blipFill>
+          <a:blip r:embed="rId3">
+            <a:extLst>
+              <a:ext uri="{28A0092B-C50C-407E-A947-70E740481C1C}">
+                <a14:useLocalDpi xmlns:a14="http://schemas.microsoft.com/office/drawing/2010/main" val="0"/>
+              </a:ext>
+            </a:extLst>
+          </a:blip>
+          <a:srcRect/>
+          <a:stretch>
+            <a:fillRect/>
+          </a:stretch>
+        </p:blipFill>
+        <p:spPr bwMode="auto">
+          <a:xfrm>
+            <a:off x="8701242" y="2242854"/>
+            <a:ext cx="3345944" cy="2177937"/>
+          </a:xfrm>
+          <a:prstGeom prst="rect">
+            <a:avLst/>
+          </a:prstGeom>
+          <a:noFill/>
+          <a:extLst>
+            <a:ext uri="{909E8E84-426E-40DD-AFC4-6F175D3DCCD1}">
+              <a14:hiddenFill xmlns:a14="http://schemas.microsoft.com/office/drawing/2010/main">
+                <a:solidFill>
+                  <a:srgbClr val="FFFFFF"/>
+                </a:solidFill>
+              </a14:hiddenFill>
+            </a:ext>
+          </a:extLst>
+        </p:spPr>
+      </p:pic>
+      <p:pic>
+        <p:nvPicPr>
+          <p:cNvPr id="2054" name="Picture 6">
+            <a:extLst>
+              <a:ext uri="{FF2B5EF4-FFF2-40B4-BE49-F238E27FC236}">
+                <a16:creationId xmlns:a16="http://schemas.microsoft.com/office/drawing/2014/main" id="{771E3DD3-8FE6-448E-AD45-AA980B455AFF}"/>
+              </a:ext>
+            </a:extLst>
+          </p:cNvPr>
+          <p:cNvPicPr>
+            <a:picLocks noChangeAspect="1" noChangeArrowheads="1"/>
+          </p:cNvPicPr>
+          <p:nvPr/>
+        </p:nvPicPr>
+        <p:blipFill>
+          <a:blip r:embed="rId4">
+            <a:extLst>
+              <a:ext uri="{28A0092B-C50C-407E-A947-70E740481C1C}">
+                <a14:useLocalDpi xmlns:a14="http://schemas.microsoft.com/office/drawing/2010/main" val="0"/>
+              </a:ext>
+            </a:extLst>
+          </a:blip>
+          <a:srcRect/>
+          <a:stretch>
+            <a:fillRect/>
+          </a:stretch>
+        </p:blipFill>
+        <p:spPr bwMode="auto">
+          <a:xfrm>
+            <a:off x="8701242" y="4425837"/>
+            <a:ext cx="3345944" cy="2177937"/>
+          </a:xfrm>
+          <a:prstGeom prst="rect">
+            <a:avLst/>
+          </a:prstGeom>
+          <a:noFill/>
+          <a:extLst>
+            <a:ext uri="{909E8E84-426E-40DD-AFC4-6F175D3DCCD1}">
+              <a14:hiddenFill xmlns:a14="http://schemas.microsoft.com/office/drawing/2010/main">
+                <a:solidFill>
+                  <a:srgbClr val="FFFFFF"/>
+                </a:solidFill>
+              </a14:hiddenFill>
+            </a:ext>
+          </a:extLst>
+        </p:spPr>
+      </p:pic>
+    </p:spTree>
+    <p:extLst>
+      <p:ext uri="{BB962C8B-B14F-4D97-AF65-F5344CB8AC3E}">
+        <p14:creationId xmlns:p14="http://schemas.microsoft.com/office/powerpoint/2010/main" val="1817084467"/>
+      </p:ext>
+    </p:extLst>
+  </p:cSld>
+  <p:clrMapOvr>
+    <a:masterClrMapping/>
+  </p:clrMapOvr>
+</p:sld>
+</file>
+
+<file path=ppt/slides/slide17.xml><?xml version="1.0" encoding="utf-8"?>
+<p:sld xmlns:a="http://schemas.openxmlformats.org/drawingml/2006/main" xmlns:r="http://schemas.openxmlformats.org/officeDocument/2006/relationships" xmlns:p="http://schemas.openxmlformats.org/presentationml/2006/main">
+  <p:cSld>
+    <p:spTree>
+      <p:nvGrpSpPr>
+        <p:cNvPr id="1" name=""/>
+        <p:cNvGrpSpPr/>
+        <p:nvPr/>
+      </p:nvGrpSpPr>
+      <p:grpSpPr>
+        <a:xfrm>
+          <a:off x="0" y="0"/>
+          <a:ext cx="0" cy="0"/>
+          <a:chOff x="0" y="0"/>
+          <a:chExt cx="0" cy="0"/>
+        </a:xfrm>
+      </p:grpSpPr>
+      <p:sp>
+        <p:nvSpPr>
+          <p:cNvPr id="2" name="Title 1">
+            <a:extLst>
+              <a:ext uri="{FF2B5EF4-FFF2-40B4-BE49-F238E27FC236}">
+                <a16:creationId xmlns:a16="http://schemas.microsoft.com/office/drawing/2014/main" id="{755168B1-8406-4EBA-AC61-C0DBCDE448DD}"/>
+              </a:ext>
+            </a:extLst>
+          </p:cNvPr>
+          <p:cNvSpPr>
+            <a:spLocks noGrp="1"/>
+          </p:cNvSpPr>
+          <p:nvPr>
+            <p:ph type="title"/>
+          </p:nvPr>
+        </p:nvSpPr>
+        <p:spPr/>
+        <p:txBody>
+          <a:bodyPr/>
+          <a:lstStyle/>
+          <a:p>
+            <a:r>
+              <a:rPr lang="en-US" dirty="0"/>
+              <a:t>Third dimension -- intensity</a:t>
+            </a:r>
+          </a:p>
+        </p:txBody>
+      </p:sp>
+      <p:sp>
+        <p:nvSpPr>
+          <p:cNvPr id="3" name="Content Placeholder 2">
+            <a:extLst>
+              <a:ext uri="{FF2B5EF4-FFF2-40B4-BE49-F238E27FC236}">
+                <a16:creationId xmlns:a16="http://schemas.microsoft.com/office/drawing/2014/main" id="{17CBABC5-1A34-4201-8BE1-E65CA2E3D4B2}"/>
+              </a:ext>
+            </a:extLst>
+          </p:cNvPr>
+          <p:cNvSpPr>
+            <a:spLocks noGrp="1"/>
+          </p:cNvSpPr>
+          <p:nvPr>
+            <p:ph idx="1"/>
+          </p:nvPr>
+        </p:nvSpPr>
+        <p:spPr>
+          <a:xfrm>
+            <a:off x="598714" y="1690688"/>
+            <a:ext cx="10515600" cy="4351338"/>
+          </a:xfrm>
+        </p:spPr>
+        <p:txBody>
+          <a:bodyPr>
+            <a:normAutofit lnSpcReduction="10000"/>
+          </a:bodyPr>
+          <a:lstStyle/>
+          <a:p>
+            <a:r>
+              <a:rPr lang="en-US" dirty="0"/>
+              <a:t>How to generate dummy data? – generating random number from 2D distribution</a:t>
+            </a:r>
+          </a:p>
+          <a:p>
+            <a:pPr lvl="1"/>
+            <a:r>
+              <a:rPr lang="en-US" dirty="0"/>
+              <a:t>Uncertainty from real sample turbulence</a:t>
+            </a:r>
+          </a:p>
+          <a:p>
+            <a:pPr lvl="1"/>
+            <a:r>
+              <a:rPr lang="en-US" dirty="0"/>
+              <a:t>How to use intensity assess the identification (k2_samp?) </a:t>
+            </a:r>
+          </a:p>
+          <a:p>
+            <a:endParaRPr lang="en-US" dirty="0"/>
+          </a:p>
+          <a:p>
+            <a:r>
+              <a:rPr lang="en-US" dirty="0"/>
+              <a:t>Assist identification</a:t>
+            </a:r>
+          </a:p>
+          <a:p>
+            <a:r>
+              <a:rPr lang="en-US" dirty="0"/>
+              <a:t>Quantification</a:t>
+            </a:r>
+          </a:p>
+          <a:p>
+            <a:pPr lvl="1"/>
+            <a:r>
+              <a:rPr lang="en-US" dirty="0"/>
+              <a:t>Need a way to establish LOD for the source</a:t>
+            </a:r>
+          </a:p>
+          <a:p>
+            <a:endParaRPr lang="en-US" dirty="0"/>
+          </a:p>
+          <a:p>
+            <a:r>
+              <a:rPr lang="en-US" dirty="0" err="1"/>
+              <a:t>Realdata</a:t>
+            </a:r>
+            <a:r>
+              <a:rPr lang="en-US" dirty="0"/>
+              <a:t> in hand</a:t>
+            </a:r>
+          </a:p>
+          <a:p>
+            <a:endParaRPr lang="en-US" dirty="0"/>
+          </a:p>
+        </p:txBody>
+      </p:sp>
+      <p:pic>
+        <p:nvPicPr>
+          <p:cNvPr id="3074" name="Picture 2">
+            <a:extLst>
+              <a:ext uri="{FF2B5EF4-FFF2-40B4-BE49-F238E27FC236}">
+                <a16:creationId xmlns:a16="http://schemas.microsoft.com/office/drawing/2014/main" id="{36DED586-0B77-44F5-AAF8-A4F52E961EF2}"/>
+              </a:ext>
+            </a:extLst>
+          </p:cNvPr>
+          <p:cNvPicPr>
+            <a:picLocks noChangeAspect="1" noChangeArrowheads="1"/>
+          </p:cNvPicPr>
+          <p:nvPr/>
+        </p:nvPicPr>
+        <p:blipFill>
+          <a:blip r:embed="rId2">
+            <a:extLst>
+              <a:ext uri="{28A0092B-C50C-407E-A947-70E740481C1C}">
+                <a14:useLocalDpi xmlns:a14="http://schemas.microsoft.com/office/drawing/2010/main" val="0"/>
+              </a:ext>
+            </a:extLst>
+          </a:blip>
+          <a:srcRect/>
+          <a:stretch>
+            <a:fillRect/>
+          </a:stretch>
+        </p:blipFill>
+        <p:spPr bwMode="auto">
+          <a:xfrm>
+            <a:off x="8620125" y="4484914"/>
+            <a:ext cx="3571875" cy="2362200"/>
+          </a:xfrm>
+          <a:prstGeom prst="rect">
+            <a:avLst/>
+          </a:prstGeom>
+          <a:noFill/>
+          <a:extLst>
+            <a:ext uri="{909E8E84-426E-40DD-AFC4-6F175D3DCCD1}">
+              <a14:hiddenFill xmlns:a14="http://schemas.microsoft.com/office/drawing/2010/main">
+                <a:solidFill>
+                  <a:srgbClr val="FFFFFF"/>
+                </a:solidFill>
+              </a14:hiddenFill>
+            </a:ext>
+          </a:extLst>
+        </p:spPr>
+      </p:pic>
+      <p:pic>
+        <p:nvPicPr>
+          <p:cNvPr id="3076" name="Picture 4">
+            <a:extLst>
+              <a:ext uri="{FF2B5EF4-FFF2-40B4-BE49-F238E27FC236}">
+                <a16:creationId xmlns:a16="http://schemas.microsoft.com/office/drawing/2014/main" id="{7B3B6B71-DA3E-49F3-AFB7-3AB4E58F0542}"/>
+              </a:ext>
+            </a:extLst>
+          </p:cNvPr>
+          <p:cNvPicPr>
+            <a:picLocks noChangeAspect="1" noChangeArrowheads="1"/>
+          </p:cNvPicPr>
+          <p:nvPr/>
+        </p:nvPicPr>
+        <p:blipFill>
+          <a:blip r:embed="rId3">
+            <a:extLst>
+              <a:ext uri="{28A0092B-C50C-407E-A947-70E740481C1C}">
+                <a14:useLocalDpi xmlns:a14="http://schemas.microsoft.com/office/drawing/2010/main" val="0"/>
+              </a:ext>
+            </a:extLst>
+          </a:blip>
+          <a:srcRect/>
+          <a:stretch>
+            <a:fillRect/>
+          </a:stretch>
+        </p:blipFill>
+        <p:spPr bwMode="auto">
+          <a:xfrm>
+            <a:off x="8620125" y="2122714"/>
+            <a:ext cx="3571875" cy="2362200"/>
+          </a:xfrm>
+          <a:prstGeom prst="rect">
+            <a:avLst/>
+          </a:prstGeom>
+          <a:noFill/>
+          <a:extLst>
+            <a:ext uri="{909E8E84-426E-40DD-AFC4-6F175D3DCCD1}">
+              <a14:hiddenFill xmlns:a14="http://schemas.microsoft.com/office/drawing/2010/main">
+                <a:solidFill>
+                  <a:srgbClr val="FFFFFF"/>
+                </a:solidFill>
+              </a14:hiddenFill>
+            </a:ext>
+          </a:extLst>
+        </p:spPr>
+      </p:pic>
+    </p:spTree>
+    <p:extLst>
+      <p:ext uri="{BB962C8B-B14F-4D97-AF65-F5344CB8AC3E}">
+        <p14:creationId xmlns:p14="http://schemas.microsoft.com/office/powerpoint/2010/main" val="4140516577"/>
+      </p:ext>
+    </p:extLst>
+  </p:cSld>
+  <p:clrMapOvr>
+    <a:masterClrMapping/>
+  </p:clrMapOvr>
+</p:sld>
+</file>
+
+<file path=ppt/slides/slide18.xml><?xml version="1.0" encoding="utf-8"?>
+<p:sld xmlns:a="http://schemas.openxmlformats.org/drawingml/2006/main" xmlns:r="http://schemas.openxmlformats.org/officeDocument/2006/relationships" xmlns:p="http://schemas.openxmlformats.org/presentationml/2006/main">
+  <p:cSld>
+    <p:spTree>
+      <p:nvGrpSpPr>
+        <p:cNvPr id="1" name=""/>
+        <p:cNvGrpSpPr/>
+        <p:nvPr/>
+      </p:nvGrpSpPr>
+      <p:grpSpPr>
+        <a:xfrm>
+          <a:off x="0" y="0"/>
+          <a:ext cx="0" cy="0"/>
+          <a:chOff x="0" y="0"/>
+          <a:chExt cx="0" cy="0"/>
+        </a:xfrm>
+      </p:grpSpPr>
+      <p:sp>
+        <p:nvSpPr>
+          <p:cNvPr id="2" name="Title 1">
+            <a:extLst>
+              <a:ext uri="{FF2B5EF4-FFF2-40B4-BE49-F238E27FC236}">
+                <a16:creationId xmlns:a16="http://schemas.microsoft.com/office/drawing/2014/main" id="{B8901887-FDC0-4F49-B7A2-69599EAD55C0}"/>
+              </a:ext>
+            </a:extLst>
+          </p:cNvPr>
+          <p:cNvSpPr>
+            <a:spLocks noGrp="1"/>
+          </p:cNvSpPr>
+          <p:nvPr>
+            <p:ph type="title"/>
+          </p:nvPr>
+        </p:nvSpPr>
+        <p:spPr/>
+        <p:txBody>
+          <a:bodyPr/>
+          <a:lstStyle/>
+          <a:p>
+            <a:r>
+              <a:rPr lang="en-US" dirty="0"/>
+              <a:t>Multiple sources</a:t>
+            </a:r>
+          </a:p>
+        </p:txBody>
+      </p:sp>
+      <p:sp>
+        <p:nvSpPr>
+          <p:cNvPr id="3" name="Content Placeholder 2">
+            <a:extLst>
+              <a:ext uri="{FF2B5EF4-FFF2-40B4-BE49-F238E27FC236}">
+                <a16:creationId xmlns:a16="http://schemas.microsoft.com/office/drawing/2014/main" id="{9BCE16D8-AAD8-4B95-B003-AD019C5DB0E3}"/>
+              </a:ext>
+            </a:extLst>
+          </p:cNvPr>
+          <p:cNvSpPr>
+            <a:spLocks noGrp="1"/>
+          </p:cNvSpPr>
+          <p:nvPr>
+            <p:ph idx="1"/>
+          </p:nvPr>
+        </p:nvSpPr>
+        <p:spPr/>
+        <p:txBody>
+          <a:bodyPr/>
+          <a:lstStyle/>
+          <a:p>
+            <a:r>
+              <a:rPr lang="en-US" dirty="0"/>
+              <a:t>Treat as separate single source problem, then do a Venn diagram</a:t>
+            </a:r>
+          </a:p>
+          <a:p>
+            <a:r>
+              <a:rPr lang="en-US" dirty="0"/>
+              <a:t>Quantification strategy awaiting </a:t>
+            </a:r>
+          </a:p>
+        </p:txBody>
+      </p:sp>
+    </p:spTree>
+    <p:extLst>
+      <p:ext uri="{BB962C8B-B14F-4D97-AF65-F5344CB8AC3E}">
+        <p14:creationId xmlns:p14="http://schemas.microsoft.com/office/powerpoint/2010/main" val="40162409"/>
       </p:ext>
     </p:extLst>
   </p:cSld>

</xml_diff>